<commit_message>
presentation sheme partie livrable
</commit_message>
<xml_diff>
--- a/Sheme.pptx
+++ b/Sheme.pptx
@@ -5,17 +5,19 @@
     <p:sldMasterId id="2147483708" r:id="rId1"/>
   </p:sldMasterIdLst>
   <p:notesMasterIdLst>
-    <p:notesMasterId r:id="rId10"/>
+    <p:notesMasterId r:id="rId12"/>
   </p:notesMasterIdLst>
   <p:sldIdLst>
     <p:sldId id="256" r:id="rId2"/>
     <p:sldId id="257" r:id="rId3"/>
     <p:sldId id="258" r:id="rId4"/>
     <p:sldId id="259" r:id="rId5"/>
-    <p:sldId id="260" r:id="rId6"/>
-    <p:sldId id="261" r:id="rId7"/>
-    <p:sldId id="263" r:id="rId8"/>
-    <p:sldId id="262" r:id="rId9"/>
+    <p:sldId id="265" r:id="rId6"/>
+    <p:sldId id="264" r:id="rId7"/>
+    <p:sldId id="260" r:id="rId8"/>
+    <p:sldId id="261" r:id="rId9"/>
+    <p:sldId id="263" r:id="rId10"/>
+    <p:sldId id="262" r:id="rId11"/>
   </p:sldIdLst>
   <p:sldSz cx="9144000" cy="6858000" type="screen4x3"/>
   <p:notesSz cx="6858000" cy="9144000"/>
@@ -1022,11 +1024,7 @@
         <a:p>
           <a:r>
             <a:rPr lang="fr-FR" noProof="0" dirty="0" smtClean="0"/>
-            <a:t>Rédaction du manuel utilisateur et de la </a:t>
-          </a:r>
-          <a:r>
-            <a:rPr lang="fr-FR" noProof="0" dirty="0" smtClean="0"/>
-            <a:t>documentation de conception</a:t>
+            <a:t>Rédaction du manuel utilisateur et de la documentation de conception</a:t>
           </a:r>
           <a:endParaRPr lang="fr-FR" noProof="0" dirty="0"/>
         </a:p>
@@ -1535,11 +1533,7 @@
           </a:pPr>
           <a:r>
             <a:rPr lang="fr-FR" sz="1800" kern="1200" noProof="0" dirty="0" smtClean="0"/>
-            <a:t>Rédaction du manuel utilisateur et de la </a:t>
-          </a:r>
-          <a:r>
-            <a:rPr lang="fr-FR" sz="1800" kern="1200" noProof="0" dirty="0" smtClean="0"/>
-            <a:t>documentation de conception</a:t>
+            <a:t>Rédaction du manuel utilisateur et de la documentation de conception</a:t>
           </a:r>
           <a:endParaRPr lang="fr-FR" sz="1800" kern="1200" noProof="0" dirty="0"/>
         </a:p>
@@ -3156,7 +3150,7 @@
           <a:p>
             <a:fld id="{6A5C4556-5453-4E19-887E-A97705F9CD8C}" type="slidenum">
               <a:rPr lang="fr-FR" smtClean="0"/>
-              <a:t>5</a:t>
+              <a:t>7</a:t>
             </a:fld>
             <a:endParaRPr lang="fr-FR"/>
           </a:p>
@@ -6486,8 +6480,8 @@
         </p:nvSpPr>
         <p:spPr>
           <a:xfrm>
-            <a:off x="683568" y="3921353"/>
-            <a:ext cx="7848872" cy="523220"/>
+            <a:off x="657701" y="3861048"/>
+            <a:ext cx="7848872" cy="677108"/>
           </a:xfrm>
           <a:prstGeom prst="rect">
             <a:avLst/>
@@ -6502,10 +6496,10 @@
           <a:p>
             <a:pPr algn="ctr"/>
             <a:r>
-              <a:rPr lang="fr-FR" sz="2800" dirty="0" smtClean="0"/>
+              <a:rPr lang="fr-FR" sz="3800" dirty="0" smtClean="0"/>
               <a:t>« Etude d’événements en finance »</a:t>
             </a:r>
-            <a:endParaRPr lang="fr-FR" sz="2800" dirty="0"/>
+            <a:endParaRPr lang="fr-FR" sz="3800" dirty="0"/>
           </a:p>
         </p:txBody>
       </p:sp>
@@ -6623,6 +6617,241 @@
         </p:nvSpPr>
         <p:spPr>
           <a:xfrm>
+            <a:off x="683568" y="4941168"/>
+            <a:ext cx="7848872" cy="369332"/>
+          </a:xfrm>
+          <a:prstGeom prst="rect">
+            <a:avLst/>
+          </a:prstGeom>
+          <a:noFill/>
+        </p:spPr>
+        <p:txBody>
+          <a:bodyPr wrap="square" rtlCol="0">
+            <a:spAutoFit/>
+          </a:bodyPr>
+          <a:lstStyle/>
+          <a:p>
+            <a:pPr algn="ctr"/>
+            <a:r>
+              <a:rPr lang="fr-FR" dirty="0" smtClean="0"/>
+              <a:t>3 Juin 2015</a:t>
+            </a:r>
+            <a:endParaRPr lang="fr-FR" dirty="0"/>
+          </a:p>
+        </p:txBody>
+      </p:sp>
+    </p:spTree>
+    <p:extLst>
+      <p:ext uri="{BB962C8B-B14F-4D97-AF65-F5344CB8AC3E}">
+        <p14:creationId xmlns:p14="http://schemas.microsoft.com/office/powerpoint/2010/main" val="1448724310"/>
+      </p:ext>
+    </p:extLst>
+  </p:cSld>
+  <p:clrMapOvr>
+    <a:masterClrMapping/>
+  </p:clrMapOvr>
+  <p:timing>
+    <p:tnLst>
+      <p:par>
+        <p:cTn id="1" dur="indefinite" restart="never" nodeType="tmRoot"/>
+      </p:par>
+    </p:tnLst>
+  </p:timing>
+</p:sld>
+</file>
+
+<file path=ppt/slides/slide10.xml><?xml version="1.0" encoding="utf-8"?>
+<p:sld xmlns:a="http://schemas.openxmlformats.org/drawingml/2006/main" xmlns:r="http://schemas.openxmlformats.org/officeDocument/2006/relationships" xmlns:p="http://schemas.openxmlformats.org/presentationml/2006/main">
+  <p:cSld>
+    <p:spTree>
+      <p:nvGrpSpPr>
+        <p:cNvPr id="1" name=""/>
+        <p:cNvGrpSpPr/>
+        <p:nvPr/>
+      </p:nvGrpSpPr>
+      <p:grpSpPr>
+        <a:xfrm>
+          <a:off x="0" y="0"/>
+          <a:ext cx="0" cy="0"/>
+          <a:chOff x="0" y="0"/>
+          <a:chExt cx="0" cy="0"/>
+        </a:xfrm>
+      </p:grpSpPr>
+      <p:sp>
+        <p:nvSpPr>
+          <p:cNvPr id="12" name="ZoneTexte 11"/>
+          <p:cNvSpPr txBox="1"/>
+          <p:nvPr/>
+        </p:nvSpPr>
+        <p:spPr>
+          <a:xfrm>
+            <a:off x="6263680" y="1374270"/>
+            <a:ext cx="2880320" cy="369332"/>
+          </a:xfrm>
+          <a:prstGeom prst="rect">
+            <a:avLst/>
+          </a:prstGeom>
+          <a:noFill/>
+        </p:spPr>
+        <p:txBody>
+          <a:bodyPr wrap="square" rtlCol="0">
+            <a:spAutoFit/>
+          </a:bodyPr>
+          <a:lstStyle/>
+          <a:p>
+            <a:r>
+              <a:rPr lang="fr-FR" dirty="0" smtClean="0"/>
+              <a:t>Projet de spécialité 2015</a:t>
+            </a:r>
+            <a:endParaRPr lang="fr-FR" dirty="0"/>
+          </a:p>
+        </p:txBody>
+      </p:sp>
+      <p:sp>
+        <p:nvSpPr>
+          <p:cNvPr id="13" name="ZoneTexte 12"/>
+          <p:cNvSpPr txBox="1"/>
+          <p:nvPr/>
+        </p:nvSpPr>
+        <p:spPr>
+          <a:xfrm>
+            <a:off x="683568" y="3921353"/>
+            <a:ext cx="7848872" cy="523220"/>
+          </a:xfrm>
+          <a:prstGeom prst="rect">
+            <a:avLst/>
+          </a:prstGeom>
+          <a:noFill/>
+        </p:spPr>
+        <p:txBody>
+          <a:bodyPr wrap="square" rtlCol="0">
+            <a:spAutoFit/>
+          </a:bodyPr>
+          <a:lstStyle/>
+          <a:p>
+            <a:pPr algn="ctr"/>
+            <a:r>
+              <a:rPr lang="fr-FR" sz="2800" dirty="0" smtClean="0"/>
+              <a:t>« Etude d’événements en finance »</a:t>
+            </a:r>
+            <a:endParaRPr lang="fr-FR" sz="2800" dirty="0"/>
+          </a:p>
+        </p:txBody>
+      </p:sp>
+      <p:sp>
+        <p:nvSpPr>
+          <p:cNvPr id="14" name="ZoneTexte 13"/>
+          <p:cNvSpPr txBox="1"/>
+          <p:nvPr/>
+        </p:nvSpPr>
+        <p:spPr>
+          <a:xfrm>
+            <a:off x="323528" y="672371"/>
+            <a:ext cx="2736304" cy="923330"/>
+          </a:xfrm>
+          <a:prstGeom prst="rect">
+            <a:avLst/>
+          </a:prstGeom>
+          <a:noFill/>
+        </p:spPr>
+        <p:txBody>
+          <a:bodyPr wrap="square" rtlCol="0">
+            <a:spAutoFit/>
+          </a:bodyPr>
+          <a:lstStyle/>
+          <a:p>
+            <a:r>
+              <a:rPr lang="fr-FR" dirty="0" smtClean="0"/>
+              <a:t>Fadoua LACHKAR</a:t>
+            </a:r>
+          </a:p>
+          <a:p>
+            <a:r>
+              <a:rPr lang="fr-FR" dirty="0" smtClean="0"/>
+              <a:t>John-Elie MARGOT</a:t>
+            </a:r>
+          </a:p>
+          <a:p>
+            <a:r>
+              <a:rPr lang="fr-FR" dirty="0" smtClean="0"/>
+              <a:t>Antoine MULET</a:t>
+            </a:r>
+            <a:endParaRPr lang="fr-FR" dirty="0"/>
+          </a:p>
+        </p:txBody>
+      </p:sp>
+      <p:sp>
+        <p:nvSpPr>
+          <p:cNvPr id="15" name="Espace réservé du numéro de diapositive 14"/>
+          <p:cNvSpPr>
+            <a:spLocks noGrp="1"/>
+          </p:cNvSpPr>
+          <p:nvPr>
+            <p:ph type="sldNum" sz="quarter" idx="12"/>
+          </p:nvPr>
+        </p:nvSpPr>
+        <p:spPr/>
+        <p:txBody>
+          <a:bodyPr/>
+          <a:lstStyle/>
+          <a:p>
+            <a:fld id="{454E7F5D-90A1-42E1-88A9-4F679448623C}" type="slidenum">
+              <a:rPr lang="fr-FR" smtClean="0"/>
+              <a:t>10</a:t>
+            </a:fld>
+            <a:endParaRPr lang="fr-FR"/>
+          </a:p>
+        </p:txBody>
+      </p:sp>
+      <p:pic>
+        <p:nvPicPr>
+          <p:cNvPr id="1026" name="Picture 2" descr="http://www.google.fr/url?source=imglanding&amp;ct=img&amp;q=http://ensimag.grenoble-inp.fr/images/ensimag/logo.gif&amp;sa=X&amp;ei=5JhtVY3WF6nmyQODsIDwCA&amp;ved=0CAkQ8wc&amp;usg=AFQjCNEv76CC0zvK5rNYkIgfM1r7N233kw"/>
+          <p:cNvPicPr>
+            <a:picLocks noChangeAspect="1" noChangeArrowheads="1"/>
+          </p:cNvPicPr>
+          <p:nvPr/>
+        </p:nvPicPr>
+        <p:blipFill>
+          <a:blip r:embed="rId2">
+            <a:extLst>
+              <a:ext uri="{28A0092B-C50C-407E-A947-70E740481C1C}">
+                <a14:useLocalDpi xmlns:a14="http://schemas.microsoft.com/office/drawing/2010/main" val="0"/>
+              </a:ext>
+            </a:extLst>
+          </a:blip>
+          <a:srcRect/>
+          <a:stretch>
+            <a:fillRect/>
+          </a:stretch>
+        </p:blipFill>
+        <p:spPr bwMode="auto">
+          <a:xfrm>
+            <a:off x="6444208" y="351103"/>
+            <a:ext cx="1933575" cy="1143001"/>
+          </a:xfrm>
+          <a:prstGeom prst="rect">
+            <a:avLst/>
+          </a:prstGeom>
+          <a:noFill/>
+          <a:extLst>
+            <a:ext uri="{909E8E84-426E-40DD-AFC4-6F175D3DCCD1}">
+              <a14:hiddenFill xmlns:a14="http://schemas.microsoft.com/office/drawing/2010/main">
+                <a:solidFill>
+                  <a:srgbClr val="FFFFFF"/>
+                </a:solidFill>
+              </a14:hiddenFill>
+            </a:ext>
+          </a:extLst>
+        </p:spPr>
+      </p:pic>
+      <p:sp>
+        <p:nvSpPr>
+          <p:cNvPr id="7" name="ZoneTexte 6"/>
+          <p:cNvSpPr txBox="1"/>
+          <p:nvPr/>
+        </p:nvSpPr>
+        <p:spPr>
+          <a:xfrm>
             <a:off x="683568" y="4581128"/>
             <a:ext cx="7848872" cy="369332"/>
           </a:xfrm>
@@ -6649,7 +6878,7 @@
     </p:spTree>
     <p:extLst>
       <p:ext uri="{BB962C8B-B14F-4D97-AF65-F5344CB8AC3E}">
-        <p14:creationId xmlns:p14="http://schemas.microsoft.com/office/powerpoint/2010/main" val="1448724310"/>
+        <p14:creationId xmlns:p14="http://schemas.microsoft.com/office/powerpoint/2010/main" val="2244919645"/>
       </p:ext>
     </p:extLst>
   </p:cSld>
@@ -6754,7 +6983,11 @@
             <a:pPr lvl="1"/>
             <a:r>
               <a:rPr lang="fr-FR" dirty="0" smtClean="0"/>
-              <a:t>Une macro pour Excel</a:t>
+              <a:t>Un complément </a:t>
+            </a:r>
+            <a:r>
+              <a:rPr lang="fr-FR" dirty="0" smtClean="0"/>
+              <a:t>Excel</a:t>
             </a:r>
           </a:p>
           <a:p>
@@ -9185,40 +9418,15 @@
           <a:p>
             <a:r>
               <a:rPr lang="fr-FR" dirty="0" smtClean="0"/>
-              <a:t>Etapes de travail</a:t>
+              <a:t>Le livrable</a:t>
             </a:r>
             <a:endParaRPr lang="fr-FR" dirty="0"/>
           </a:p>
         </p:txBody>
       </p:sp>
-      <p:graphicFrame>
-        <p:nvGraphicFramePr>
-          <p:cNvPr id="6" name="Espace réservé du contenu 5"/>
-          <p:cNvGraphicFramePr>
-            <a:graphicFrameLocks noGrp="1"/>
-          </p:cNvGraphicFramePr>
-          <p:nvPr>
-            <p:ph idx="1"/>
-            <p:extLst>
-              <p:ext uri="{D42A27DB-BD31-4B8C-83A1-F6EECF244321}">
-                <p14:modId xmlns:p14="http://schemas.microsoft.com/office/powerpoint/2010/main" val="123860370"/>
-              </p:ext>
-            </p:extLst>
-          </p:nvPr>
-        </p:nvGraphicFramePr>
-        <p:xfrm>
-          <a:off x="179512" y="1628800"/>
-          <a:ext cx="8712967" cy="4781525"/>
-        </p:xfrm>
-        <a:graphic>
-          <a:graphicData uri="http://schemas.openxmlformats.org/drawingml/2006/diagram">
-            <dgm:relIds xmlns:dgm="http://schemas.openxmlformats.org/drawingml/2006/diagram" xmlns:r="http://schemas.openxmlformats.org/officeDocument/2006/relationships" r:dm="rId3" r:lo="rId4" r:qs="rId5" r:cs="rId6"/>
-          </a:graphicData>
-        </a:graphic>
-      </p:graphicFrame>
-      <p:sp>
-        <p:nvSpPr>
-          <p:cNvPr id="4" name="Espace réservé du numéro de diapositive 3"/>
+      <p:sp>
+        <p:nvSpPr>
+          <p:cNvPr id="3" name="Espace réservé du numéro de diapositive 2"/>
           <p:cNvSpPr>
             <a:spLocks noGrp="1"/>
           </p:cNvSpPr>
@@ -9239,10 +9447,269 @@
           </a:p>
         </p:txBody>
       </p:sp>
+      <p:sp>
+        <p:nvSpPr>
+          <p:cNvPr id="6" name="Espace réservé du contenu 2"/>
+          <p:cNvSpPr txBox="1">
+            <a:spLocks/>
+          </p:cNvSpPr>
+          <p:nvPr/>
+        </p:nvSpPr>
+        <p:spPr>
+          <a:xfrm>
+            <a:off x="457200" y="2060848"/>
+            <a:ext cx="8229600" cy="3120008"/>
+          </a:xfrm>
+          <a:prstGeom prst="rect">
+            <a:avLst/>
+          </a:prstGeom>
+        </p:spPr>
+        <p:txBody>
+          <a:bodyPr/>
+          <a:lstStyle>
+            <a:lvl1pPr marL="182880" indent="-182880" algn="l" defTabSz="914400" rtl="0" eaLnBrk="1" latinLnBrk="0" hangingPunct="1">
+              <a:spcBef>
+                <a:spcPct val="20000"/>
+              </a:spcBef>
+              <a:buClr>
+                <a:schemeClr val="accent1"/>
+              </a:buClr>
+              <a:buSzPct val="85000"/>
+              <a:buFont typeface="Arial" pitchFamily="34" charset="0"/>
+              <a:buChar char="•"/>
+              <a:defRPr sz="2400" kern="1200">
+                <a:solidFill>
+                  <a:schemeClr val="tx1"/>
+                </a:solidFill>
+                <a:latin typeface="+mn-lt"/>
+                <a:ea typeface="+mn-ea"/>
+                <a:cs typeface="+mn-cs"/>
+              </a:defRPr>
+            </a:lvl1pPr>
+            <a:lvl2pPr marL="457200" indent="-182880" algn="l" defTabSz="914400" rtl="0" eaLnBrk="1" latinLnBrk="0" hangingPunct="1">
+              <a:spcBef>
+                <a:spcPct val="20000"/>
+              </a:spcBef>
+              <a:buClr>
+                <a:schemeClr val="accent1"/>
+              </a:buClr>
+              <a:buSzPct val="85000"/>
+              <a:buFont typeface="Arial" pitchFamily="34" charset="0"/>
+              <a:buChar char="•"/>
+              <a:defRPr sz="2000" kern="1200">
+                <a:solidFill>
+                  <a:schemeClr val="tx1"/>
+                </a:solidFill>
+                <a:latin typeface="+mn-lt"/>
+                <a:ea typeface="+mn-ea"/>
+                <a:cs typeface="+mn-cs"/>
+              </a:defRPr>
+            </a:lvl2pPr>
+            <a:lvl3pPr marL="731520" indent="-182880" algn="l" defTabSz="914400" rtl="0" eaLnBrk="1" latinLnBrk="0" hangingPunct="1">
+              <a:spcBef>
+                <a:spcPct val="20000"/>
+              </a:spcBef>
+              <a:buClr>
+                <a:schemeClr val="accent1"/>
+              </a:buClr>
+              <a:buSzPct val="90000"/>
+              <a:buFont typeface="Arial" pitchFamily="34" charset="0"/>
+              <a:buChar char="•"/>
+              <a:defRPr sz="1800" kern="1200">
+                <a:solidFill>
+                  <a:schemeClr val="tx1"/>
+                </a:solidFill>
+                <a:latin typeface="+mn-lt"/>
+                <a:ea typeface="+mn-ea"/>
+                <a:cs typeface="+mn-cs"/>
+              </a:defRPr>
+            </a:lvl3pPr>
+            <a:lvl4pPr marL="1005840" indent="-182880" algn="l" defTabSz="914400" rtl="0" eaLnBrk="1" latinLnBrk="0" hangingPunct="1">
+              <a:spcBef>
+                <a:spcPct val="20000"/>
+              </a:spcBef>
+              <a:buClr>
+                <a:schemeClr val="accent1"/>
+              </a:buClr>
+              <a:buFont typeface="Arial" pitchFamily="34" charset="0"/>
+              <a:buChar char="•"/>
+              <a:defRPr sz="1600" kern="1200">
+                <a:solidFill>
+                  <a:schemeClr val="tx1"/>
+                </a:solidFill>
+                <a:latin typeface="+mn-lt"/>
+                <a:ea typeface="+mn-ea"/>
+                <a:cs typeface="+mn-cs"/>
+              </a:defRPr>
+            </a:lvl4pPr>
+            <a:lvl5pPr marL="1188720" indent="-137160" algn="l" defTabSz="914400" rtl="0" eaLnBrk="1" latinLnBrk="0" hangingPunct="1">
+              <a:spcBef>
+                <a:spcPct val="20000"/>
+              </a:spcBef>
+              <a:buClr>
+                <a:schemeClr val="accent1"/>
+              </a:buClr>
+              <a:buSzPct val="100000"/>
+              <a:buFont typeface="Arial" pitchFamily="34" charset="0"/>
+              <a:buChar char="•"/>
+              <a:defRPr sz="1400" kern="1200" baseline="0">
+                <a:solidFill>
+                  <a:schemeClr val="tx1"/>
+                </a:solidFill>
+                <a:latin typeface="+mn-lt"/>
+                <a:ea typeface="+mn-ea"/>
+                <a:cs typeface="+mn-cs"/>
+              </a:defRPr>
+            </a:lvl5pPr>
+            <a:lvl6pPr marL="1371600" indent="-182880" algn="l" defTabSz="914400" rtl="0" eaLnBrk="1" latinLnBrk="0" hangingPunct="1">
+              <a:spcBef>
+                <a:spcPct val="20000"/>
+              </a:spcBef>
+              <a:buClr>
+                <a:schemeClr val="accent1"/>
+              </a:buClr>
+              <a:buFont typeface="Arial" pitchFamily="34" charset="0"/>
+              <a:buChar char="•"/>
+              <a:defRPr sz="1300" kern="1200">
+                <a:solidFill>
+                  <a:schemeClr val="tx1"/>
+                </a:solidFill>
+                <a:latin typeface="+mn-lt"/>
+                <a:ea typeface="+mn-ea"/>
+                <a:cs typeface="+mn-cs"/>
+              </a:defRPr>
+            </a:lvl6pPr>
+            <a:lvl7pPr marL="1554480" indent="-182880" algn="l" defTabSz="914400" rtl="0" eaLnBrk="1" latinLnBrk="0" hangingPunct="1">
+              <a:spcBef>
+                <a:spcPct val="20000"/>
+              </a:spcBef>
+              <a:buClr>
+                <a:schemeClr val="accent1"/>
+              </a:buClr>
+              <a:buFont typeface="Arial" pitchFamily="34" charset="0"/>
+              <a:buChar char="•"/>
+              <a:defRPr sz="1300" kern="1200">
+                <a:solidFill>
+                  <a:schemeClr val="tx1"/>
+                </a:solidFill>
+                <a:latin typeface="+mn-lt"/>
+                <a:ea typeface="+mn-ea"/>
+                <a:cs typeface="+mn-cs"/>
+              </a:defRPr>
+            </a:lvl7pPr>
+            <a:lvl8pPr marL="1737360" indent="-182880" algn="l" defTabSz="914400" rtl="0" eaLnBrk="1" latinLnBrk="0" hangingPunct="1">
+              <a:spcBef>
+                <a:spcPct val="20000"/>
+              </a:spcBef>
+              <a:buClr>
+                <a:schemeClr val="accent1"/>
+              </a:buClr>
+              <a:buFont typeface="Arial" pitchFamily="34" charset="0"/>
+              <a:buChar char="•"/>
+              <a:defRPr sz="1300" kern="1200">
+                <a:solidFill>
+                  <a:schemeClr val="tx1"/>
+                </a:solidFill>
+                <a:latin typeface="+mn-lt"/>
+                <a:ea typeface="+mn-ea"/>
+                <a:cs typeface="+mn-cs"/>
+              </a:defRPr>
+            </a:lvl8pPr>
+            <a:lvl9pPr marL="1920240" indent="-182880" algn="l" defTabSz="914400" rtl="0" eaLnBrk="1" latinLnBrk="0" hangingPunct="1">
+              <a:spcBef>
+                <a:spcPct val="20000"/>
+              </a:spcBef>
+              <a:buClr>
+                <a:schemeClr val="accent1"/>
+              </a:buClr>
+              <a:buFont typeface="Arial" pitchFamily="34" charset="0"/>
+              <a:buChar char="•"/>
+              <a:defRPr sz="1300" kern="1200">
+                <a:solidFill>
+                  <a:schemeClr val="tx1"/>
+                </a:solidFill>
+                <a:latin typeface="+mn-lt"/>
+                <a:ea typeface="+mn-ea"/>
+                <a:cs typeface="+mn-cs"/>
+              </a:defRPr>
+            </a:lvl9pPr>
+          </a:lstStyle>
+          <a:p>
+            <a:pPr>
+              <a:spcBef>
+                <a:spcPts val="600"/>
+              </a:spcBef>
+              <a:spcAft>
+                <a:spcPts val="3600"/>
+              </a:spcAft>
+            </a:pPr>
+            <a:r>
+              <a:rPr lang="fr-FR" sz="2800" dirty="0" smtClean="0"/>
+              <a:t>Un complément Excel</a:t>
+            </a:r>
+          </a:p>
+          <a:p>
+            <a:pPr>
+              <a:spcBef>
+                <a:spcPts val="600"/>
+              </a:spcBef>
+              <a:spcAft>
+                <a:spcPts val="1200"/>
+              </a:spcAft>
+            </a:pPr>
+            <a:r>
+              <a:rPr lang="fr-FR" sz="2800" dirty="0" smtClean="0"/>
+              <a:t>Les outils utilisés</a:t>
+            </a:r>
+          </a:p>
+          <a:p>
+            <a:pPr lvl="1">
+              <a:spcBef>
+                <a:spcPts val="600"/>
+              </a:spcBef>
+              <a:spcAft>
+                <a:spcPts val="600"/>
+              </a:spcAft>
+            </a:pPr>
+            <a:r>
+              <a:rPr lang="fr-FR" sz="2200" dirty="0" smtClean="0"/>
+              <a:t>Windows</a:t>
+            </a:r>
+          </a:p>
+          <a:p>
+            <a:pPr lvl="1">
+              <a:spcBef>
+                <a:spcPts val="600"/>
+              </a:spcBef>
+              <a:spcAft>
+                <a:spcPts val="600"/>
+              </a:spcAft>
+            </a:pPr>
+            <a:r>
+              <a:rPr lang="fr-FR" sz="2200" dirty="0" smtClean="0"/>
+              <a:t>Visual Studio</a:t>
+            </a:r>
+          </a:p>
+          <a:p>
+            <a:pPr lvl="1">
+              <a:spcBef>
+                <a:spcPts val="600"/>
+              </a:spcBef>
+              <a:spcAft>
+                <a:spcPts val="600"/>
+              </a:spcAft>
+            </a:pPr>
+            <a:r>
+              <a:rPr lang="fr-FR" sz="2200" dirty="0" smtClean="0"/>
+              <a:t>Visual Basic</a:t>
+            </a:r>
+          </a:p>
+        </p:txBody>
+      </p:sp>
     </p:spTree>
     <p:extLst>
       <p:ext uri="{BB962C8B-B14F-4D97-AF65-F5344CB8AC3E}">
-        <p14:creationId xmlns:p14="http://schemas.microsoft.com/office/powerpoint/2010/main" val="3674707670"/>
+        <p14:creationId xmlns:p14="http://schemas.microsoft.com/office/powerpoint/2010/main" val="2324681322"/>
       </p:ext>
     </p:extLst>
   </p:cSld>
@@ -9293,7 +9760,7 @@
           <a:p>
             <a:r>
               <a:rPr lang="fr-FR" dirty="0" smtClean="0"/>
-              <a:t>Avancement du projet</a:t>
+              <a:t>L’interface graphique</a:t>
             </a:r>
             <a:endParaRPr lang="fr-FR" dirty="0"/>
           </a:p>
@@ -9301,7 +9768,7 @@
       </p:sp>
       <p:sp>
         <p:nvSpPr>
-          <p:cNvPr id="4" name="Espace réservé du numéro de diapositive 3"/>
+          <p:cNvPr id="3" name="Espace réservé du numéro de diapositive 2"/>
           <p:cNvSpPr>
             <a:spLocks noGrp="1"/>
           </p:cNvSpPr>
@@ -9322,99 +9789,40 @@
           </a:p>
         </p:txBody>
       </p:sp>
-      <p:sp>
-        <p:nvSpPr>
-          <p:cNvPr id="3" name="Espace réservé du contenu 2"/>
-          <p:cNvSpPr>
-            <a:spLocks noGrp="1"/>
-          </p:cNvSpPr>
-          <p:nvPr>
-            <p:ph idx="1"/>
-          </p:nvPr>
-        </p:nvSpPr>
-        <p:spPr/>
-        <p:txBody>
-          <a:bodyPr/>
-          <a:lstStyle/>
-          <a:p>
-            <a:pPr marL="0" indent="0">
-              <a:buNone/>
-            </a:pPr>
-            <a:endParaRPr lang="fr-FR" dirty="0"/>
-          </a:p>
-          <a:p>
-            <a:r>
-              <a:rPr lang="fr-FR" dirty="0"/>
-              <a:t>Développement de manière incrémentale </a:t>
-            </a:r>
-            <a:endParaRPr lang="fr-FR" dirty="0" smtClean="0"/>
-          </a:p>
-          <a:p>
-            <a:pPr lvl="1"/>
-            <a:r>
-              <a:rPr lang="fr-FR" dirty="0" smtClean="0"/>
-              <a:t>Les tests statistiques </a:t>
-            </a:r>
-          </a:p>
-          <a:p>
-            <a:pPr lvl="1"/>
-            <a:r>
-              <a:rPr lang="fr-FR" dirty="0" smtClean="0"/>
-              <a:t>Les différents modèles</a:t>
-            </a:r>
-          </a:p>
-          <a:p>
-            <a:pPr lvl="1"/>
-            <a:r>
-              <a:rPr lang="fr-FR" dirty="0" smtClean="0"/>
-              <a:t>L’interface graphique</a:t>
-            </a:r>
-          </a:p>
-          <a:p>
-            <a:pPr lvl="1"/>
-            <a:endParaRPr lang="fr-FR" dirty="0"/>
-          </a:p>
-          <a:p>
-            <a:r>
-              <a:rPr lang="fr-FR" dirty="0" smtClean="0"/>
-              <a:t>Un projet de recherche → Pas de fin déterminée</a:t>
-            </a:r>
-            <a:endParaRPr lang="fr-FR" dirty="0"/>
-          </a:p>
-          <a:p>
-            <a:pPr marL="274320" lvl="1" indent="0">
-              <a:buNone/>
-            </a:pPr>
-            <a:endParaRPr lang="fr-FR" dirty="0"/>
-          </a:p>
-          <a:p>
-            <a:pPr marL="274320" lvl="1" indent="0">
-              <a:buNone/>
-            </a:pPr>
-            <a:endParaRPr lang="fr-FR" dirty="0" smtClean="0"/>
-          </a:p>
-          <a:p>
-            <a:pPr lvl="1"/>
-            <a:endParaRPr lang="fr-FR" dirty="0"/>
-          </a:p>
-          <a:p>
-            <a:endParaRPr lang="fr-FR" dirty="0" smtClean="0"/>
-          </a:p>
-          <a:p>
-            <a:endParaRPr lang="fr-FR" dirty="0" smtClean="0"/>
-          </a:p>
-          <a:p>
-            <a:endParaRPr lang="fr-FR" dirty="0" smtClean="0"/>
-          </a:p>
-          <a:p>
-            <a:endParaRPr lang="fr-FR" dirty="0"/>
-          </a:p>
-        </p:txBody>
-      </p:sp>
+      <p:pic>
+        <p:nvPicPr>
+          <p:cNvPr id="6" name="Image 5"/>
+          <p:cNvPicPr>
+            <a:picLocks noChangeAspect="1"/>
+          </p:cNvPicPr>
+          <p:nvPr/>
+        </p:nvPicPr>
+        <p:blipFill>
+          <a:blip r:embed="rId2">
+            <a:extLst>
+              <a:ext uri="{28A0092B-C50C-407E-A947-70E740481C1C}">
+                <a14:useLocalDpi xmlns:a14="http://schemas.microsoft.com/office/drawing/2010/main" val="0"/>
+              </a:ext>
+            </a:extLst>
+          </a:blip>
+          <a:stretch>
+            <a:fillRect/>
+          </a:stretch>
+        </p:blipFill>
+        <p:spPr>
+          <a:xfrm>
+            <a:off x="125760" y="1716716"/>
+            <a:ext cx="8892480" cy="4726164"/>
+          </a:xfrm>
+          <a:prstGeom prst="rect">
+            <a:avLst/>
+          </a:prstGeom>
+        </p:spPr>
+      </p:pic>
     </p:spTree>
     <p:extLst>
       <p:ext uri="{BB962C8B-B14F-4D97-AF65-F5344CB8AC3E}">
-        <p14:creationId xmlns:p14="http://schemas.microsoft.com/office/powerpoint/2010/main" val="3683865469"/>
+        <p14:creationId xmlns:p14="http://schemas.microsoft.com/office/powerpoint/2010/main" val="1589404664"/>
       </p:ext>
     </p:extLst>
   </p:cSld>
@@ -9450,60 +9858,52 @@
       </p:grpSpPr>
       <p:sp>
         <p:nvSpPr>
-          <p:cNvPr id="3" name="Espace réservé du contenu 2"/>
+          <p:cNvPr id="2" name="Titre 1"/>
           <p:cNvSpPr>
             <a:spLocks noGrp="1"/>
           </p:cNvSpPr>
           <p:nvPr>
+            <p:ph type="title"/>
+          </p:nvPr>
+        </p:nvSpPr>
+        <p:spPr/>
+        <p:txBody>
+          <a:bodyPr/>
+          <a:lstStyle/>
+          <a:p>
+            <a:r>
+              <a:rPr lang="fr-FR" dirty="0" smtClean="0"/>
+              <a:t>Etapes de travail</a:t>
+            </a:r>
+            <a:endParaRPr lang="fr-FR" dirty="0"/>
+          </a:p>
+        </p:txBody>
+      </p:sp>
+      <p:graphicFrame>
+        <p:nvGraphicFramePr>
+          <p:cNvPr id="6" name="Espace réservé du contenu 5"/>
+          <p:cNvGraphicFramePr>
+            <a:graphicFrameLocks noGrp="1"/>
+          </p:cNvGraphicFramePr>
+          <p:nvPr>
             <p:ph idx="1"/>
+            <p:extLst>
+              <p:ext uri="{D42A27DB-BD31-4B8C-83A1-F6EECF244321}">
+                <p14:modId xmlns:p14="http://schemas.microsoft.com/office/powerpoint/2010/main" val="123860370"/>
+              </p:ext>
+            </p:extLst>
           </p:nvPr>
-        </p:nvSpPr>
-        <p:spPr/>
-        <p:txBody>
-          <a:bodyPr>
-            <a:normAutofit/>
-          </a:bodyPr>
-          <a:lstStyle/>
-          <a:p>
-            <a:pPr marL="0" indent="0" algn="ctr">
-              <a:buNone/>
-            </a:pPr>
-            <a:endParaRPr lang="fr-FR" sz="4800" dirty="0" smtClean="0"/>
-          </a:p>
-          <a:p>
-            <a:pPr marL="0" indent="0" algn="ctr">
-              <a:buNone/>
-            </a:pPr>
-            <a:r>
-              <a:rPr lang="fr-FR" sz="4800" spc="-100" dirty="0">
-                <a:solidFill>
-                  <a:schemeClr val="tx2"/>
-                </a:solidFill>
-                <a:latin typeface="+mj-lt"/>
-                <a:ea typeface="+mj-ea"/>
-                <a:cs typeface="+mj-cs"/>
-              </a:rPr>
-              <a:t>Merci pour votre </a:t>
-            </a:r>
-          </a:p>
-          <a:p>
-            <a:pPr marL="0" indent="0" algn="ctr">
-              <a:buNone/>
-            </a:pPr>
-            <a:r>
-              <a:rPr lang="fr-FR" sz="4800" spc="-100" dirty="0">
-                <a:solidFill>
-                  <a:schemeClr val="tx2"/>
-                </a:solidFill>
-                <a:latin typeface="+mj-lt"/>
-                <a:ea typeface="+mj-ea"/>
-                <a:cs typeface="+mj-cs"/>
-              </a:rPr>
-              <a:t>attention </a:t>
-            </a:r>
-          </a:p>
-        </p:txBody>
-      </p:sp>
+        </p:nvGraphicFramePr>
+        <p:xfrm>
+          <a:off x="179512" y="1628800"/>
+          <a:ext cx="8712967" cy="4781525"/>
+        </p:xfrm>
+        <a:graphic>
+          <a:graphicData uri="http://schemas.openxmlformats.org/drawingml/2006/diagram">
+            <dgm:relIds xmlns:dgm="http://schemas.openxmlformats.org/drawingml/2006/diagram" xmlns:r="http://schemas.openxmlformats.org/officeDocument/2006/relationships" r:dm="rId3" r:lo="rId4" r:qs="rId5" r:cs="rId6"/>
+          </a:graphicData>
+        </a:graphic>
+      </p:graphicFrame>
       <p:sp>
         <p:nvSpPr>
           <p:cNvPr id="4" name="Espace réservé du numéro de diapositive 3"/>
@@ -9530,13 +9930,20 @@
     </p:spTree>
     <p:extLst>
       <p:ext uri="{BB962C8B-B14F-4D97-AF65-F5344CB8AC3E}">
-        <p14:creationId xmlns:p14="http://schemas.microsoft.com/office/powerpoint/2010/main" val="1741150457"/>
+        <p14:creationId xmlns:p14="http://schemas.microsoft.com/office/powerpoint/2010/main" val="3674707670"/>
       </p:ext>
     </p:extLst>
   </p:cSld>
   <p:clrMapOvr>
     <a:masterClrMapping/>
   </p:clrMapOvr>
+  <p:timing>
+    <p:tnLst>
+      <p:par>
+        <p:cTn id="1" dur="indefinite" restart="never" nodeType="tmRoot"/>
+      </p:par>
+    </p:tnLst>
+  </p:timing>
 </p:sld>
 </file>
 
@@ -9559,29 +9966,22 @@
       </p:grpSpPr>
       <p:sp>
         <p:nvSpPr>
-          <p:cNvPr id="12" name="ZoneTexte 11"/>
-          <p:cNvSpPr txBox="1"/>
-          <p:nvPr/>
-        </p:nvSpPr>
-        <p:spPr>
-          <a:xfrm>
-            <a:off x="6263680" y="1374270"/>
-            <a:ext cx="2880320" cy="369332"/>
-          </a:xfrm>
-          <a:prstGeom prst="rect">
-            <a:avLst/>
-          </a:prstGeom>
-          <a:noFill/>
-        </p:spPr>
-        <p:txBody>
-          <a:bodyPr wrap="square" rtlCol="0">
-            <a:spAutoFit/>
-          </a:bodyPr>
+          <p:cNvPr id="2" name="Titre 1"/>
+          <p:cNvSpPr>
+            <a:spLocks noGrp="1"/>
+          </p:cNvSpPr>
+          <p:nvPr>
+            <p:ph type="title"/>
+          </p:nvPr>
+        </p:nvSpPr>
+        <p:spPr/>
+        <p:txBody>
+          <a:bodyPr/>
           <a:lstStyle/>
           <a:p>
             <a:r>
               <a:rPr lang="fr-FR" dirty="0" smtClean="0"/>
-              <a:t>Projet de spécialité 2015</a:t>
+              <a:t>Avancement du projet</a:t>
             </a:r>
             <a:endParaRPr lang="fr-FR" dirty="0"/>
           </a:p>
@@ -9589,80 +9989,7 @@
       </p:sp>
       <p:sp>
         <p:nvSpPr>
-          <p:cNvPr id="13" name="ZoneTexte 12"/>
-          <p:cNvSpPr txBox="1"/>
-          <p:nvPr/>
-        </p:nvSpPr>
-        <p:spPr>
-          <a:xfrm>
-            <a:off x="683568" y="3921353"/>
-            <a:ext cx="7848872" cy="523220"/>
-          </a:xfrm>
-          <a:prstGeom prst="rect">
-            <a:avLst/>
-          </a:prstGeom>
-          <a:noFill/>
-        </p:spPr>
-        <p:txBody>
-          <a:bodyPr wrap="square" rtlCol="0">
-            <a:spAutoFit/>
-          </a:bodyPr>
-          <a:lstStyle/>
-          <a:p>
-            <a:pPr algn="ctr"/>
-            <a:r>
-              <a:rPr lang="fr-FR" sz="2800" dirty="0" smtClean="0"/>
-              <a:t>« Etude d’événements en finance »</a:t>
-            </a:r>
-            <a:endParaRPr lang="fr-FR" sz="2800" dirty="0"/>
-          </a:p>
-        </p:txBody>
-      </p:sp>
-      <p:sp>
-        <p:nvSpPr>
-          <p:cNvPr id="14" name="ZoneTexte 13"/>
-          <p:cNvSpPr txBox="1"/>
-          <p:nvPr/>
-        </p:nvSpPr>
-        <p:spPr>
-          <a:xfrm>
-            <a:off x="323528" y="672371"/>
-            <a:ext cx="2736304" cy="923330"/>
-          </a:xfrm>
-          <a:prstGeom prst="rect">
-            <a:avLst/>
-          </a:prstGeom>
-          <a:noFill/>
-        </p:spPr>
-        <p:txBody>
-          <a:bodyPr wrap="square" rtlCol="0">
-            <a:spAutoFit/>
-          </a:bodyPr>
-          <a:lstStyle/>
-          <a:p>
-            <a:r>
-              <a:rPr lang="fr-FR" dirty="0" smtClean="0"/>
-              <a:t>Fadoua LACHKAR</a:t>
-            </a:r>
-          </a:p>
-          <a:p>
-            <a:r>
-              <a:rPr lang="fr-FR" dirty="0" smtClean="0"/>
-              <a:t>John-Elie MARGOT</a:t>
-            </a:r>
-          </a:p>
-          <a:p>
-            <a:r>
-              <a:rPr lang="fr-FR" dirty="0" smtClean="0"/>
-              <a:t>Antoine MULET</a:t>
-            </a:r>
-            <a:endParaRPr lang="fr-FR" dirty="0"/>
-          </a:p>
-        </p:txBody>
-      </p:sp>
-      <p:sp>
-        <p:nvSpPr>
-          <p:cNvPr id="15" name="Espace réservé du numéro de diapositive 14"/>
+          <p:cNvPr id="4" name="Espace réservé du numéro de diapositive 3"/>
           <p:cNvSpPr>
             <a:spLocks noGrp="1"/>
           </p:cNvSpPr>
@@ -9683,74 +10010,91 @@
           </a:p>
         </p:txBody>
       </p:sp>
-      <p:pic>
-        <p:nvPicPr>
-          <p:cNvPr id="1026" name="Picture 2" descr="http://www.google.fr/url?source=imglanding&amp;ct=img&amp;q=http://ensimag.grenoble-inp.fr/images/ensimag/logo.gif&amp;sa=X&amp;ei=5JhtVY3WF6nmyQODsIDwCA&amp;ved=0CAkQ8wc&amp;usg=AFQjCNEv76CC0zvK5rNYkIgfM1r7N233kw"/>
-          <p:cNvPicPr>
-            <a:picLocks noChangeAspect="1" noChangeArrowheads="1"/>
-          </p:cNvPicPr>
-          <p:nvPr/>
-        </p:nvPicPr>
-        <p:blipFill>
-          <a:blip r:embed="rId2">
-            <a:extLst>
-              <a:ext uri="{28A0092B-C50C-407E-A947-70E740481C1C}">
-                <a14:useLocalDpi xmlns:a14="http://schemas.microsoft.com/office/drawing/2010/main" val="0"/>
-              </a:ext>
-            </a:extLst>
-          </a:blip>
-          <a:srcRect/>
-          <a:stretch>
-            <a:fillRect/>
-          </a:stretch>
-        </p:blipFill>
-        <p:spPr bwMode="auto">
-          <a:xfrm>
-            <a:off x="6444208" y="351103"/>
-            <a:ext cx="1933575" cy="1143001"/>
-          </a:xfrm>
-          <a:prstGeom prst="rect">
-            <a:avLst/>
-          </a:prstGeom>
-          <a:noFill/>
-          <a:extLst>
-            <a:ext uri="{909E8E84-426E-40DD-AFC4-6F175D3DCCD1}">
-              <a14:hiddenFill xmlns:a14="http://schemas.microsoft.com/office/drawing/2010/main">
-                <a:solidFill>
-                  <a:srgbClr val="FFFFFF"/>
-                </a:solidFill>
-              </a14:hiddenFill>
-            </a:ext>
-          </a:extLst>
-        </p:spPr>
-      </p:pic>
-      <p:sp>
-        <p:nvSpPr>
-          <p:cNvPr id="7" name="ZoneTexte 6"/>
-          <p:cNvSpPr txBox="1"/>
-          <p:nvPr/>
-        </p:nvSpPr>
-        <p:spPr>
-          <a:xfrm>
-            <a:off x="683568" y="4581128"/>
-            <a:ext cx="7848872" cy="369332"/>
-          </a:xfrm>
-          <a:prstGeom prst="rect">
-            <a:avLst/>
-          </a:prstGeom>
-          <a:noFill/>
-        </p:spPr>
-        <p:txBody>
-          <a:bodyPr wrap="square" rtlCol="0">
-            <a:spAutoFit/>
-          </a:bodyPr>
+      <p:sp>
+        <p:nvSpPr>
+          <p:cNvPr id="3" name="Espace réservé du contenu 2"/>
+          <p:cNvSpPr>
+            <a:spLocks noGrp="1"/>
+          </p:cNvSpPr>
+          <p:nvPr>
+            <p:ph idx="1"/>
+          </p:nvPr>
+        </p:nvSpPr>
+        <p:spPr/>
+        <p:txBody>
+          <a:bodyPr/>
           <a:lstStyle/>
           <a:p>
-            <a:pPr algn="ctr"/>
+            <a:pPr marL="0" indent="0">
+              <a:buNone/>
+            </a:pPr>
+            <a:endParaRPr lang="fr-FR" dirty="0"/>
+          </a:p>
+          <a:p>
+            <a:r>
+              <a:rPr lang="fr-FR" dirty="0"/>
+              <a:t>Développement de manière incrémentale </a:t>
+            </a:r>
+            <a:endParaRPr lang="fr-FR" dirty="0" smtClean="0"/>
+          </a:p>
+          <a:p>
+            <a:pPr lvl="1"/>
             <a:r>
               <a:rPr lang="fr-FR" dirty="0" smtClean="0"/>
-              <a:t>3 Juin 2015</a:t>
-            </a:r>
+              <a:t>Les tests statistiques </a:t>
+            </a:r>
+          </a:p>
+          <a:p>
+            <a:pPr lvl="1"/>
+            <a:r>
+              <a:rPr lang="fr-FR" dirty="0" smtClean="0"/>
+              <a:t>Les différents modèles</a:t>
+            </a:r>
+          </a:p>
+          <a:p>
+            <a:pPr lvl="1"/>
+            <a:r>
+              <a:rPr lang="fr-FR" dirty="0" smtClean="0"/>
+              <a:t>L’interface graphique</a:t>
+            </a:r>
+          </a:p>
+          <a:p>
+            <a:pPr lvl="1"/>
+            <a:endParaRPr lang="fr-FR" dirty="0"/>
+          </a:p>
+          <a:p>
+            <a:r>
+              <a:rPr lang="fr-FR" dirty="0" smtClean="0"/>
+              <a:t>Un projet de recherche → Pas de fin déterminée</a:t>
+            </a:r>
+            <a:endParaRPr lang="fr-FR" dirty="0"/>
+          </a:p>
+          <a:p>
+            <a:pPr marL="274320" lvl="1" indent="0">
+              <a:buNone/>
+            </a:pPr>
+            <a:endParaRPr lang="fr-FR" dirty="0"/>
+          </a:p>
+          <a:p>
+            <a:pPr marL="274320" lvl="1" indent="0">
+              <a:buNone/>
+            </a:pPr>
+            <a:endParaRPr lang="fr-FR" dirty="0" smtClean="0"/>
+          </a:p>
+          <a:p>
+            <a:pPr lvl="1"/>
+            <a:endParaRPr lang="fr-FR" dirty="0"/>
+          </a:p>
+          <a:p>
+            <a:endParaRPr lang="fr-FR" dirty="0" smtClean="0"/>
+          </a:p>
+          <a:p>
+            <a:endParaRPr lang="fr-FR" dirty="0" smtClean="0"/>
+          </a:p>
+          <a:p>
+            <a:endParaRPr lang="fr-FR" dirty="0" smtClean="0"/>
+          </a:p>
+          <a:p>
             <a:endParaRPr lang="fr-FR" dirty="0"/>
           </a:p>
         </p:txBody>
@@ -9758,7 +10102,123 @@
     </p:spTree>
     <p:extLst>
       <p:ext uri="{BB962C8B-B14F-4D97-AF65-F5344CB8AC3E}">
-        <p14:creationId xmlns:p14="http://schemas.microsoft.com/office/powerpoint/2010/main" val="2244919645"/>
+        <p14:creationId xmlns:p14="http://schemas.microsoft.com/office/powerpoint/2010/main" val="3683865469"/>
+      </p:ext>
+    </p:extLst>
+  </p:cSld>
+  <p:clrMapOvr>
+    <a:masterClrMapping/>
+  </p:clrMapOvr>
+  <p:timing>
+    <p:tnLst>
+      <p:par>
+        <p:cTn id="1" dur="indefinite" restart="never" nodeType="tmRoot"/>
+      </p:par>
+    </p:tnLst>
+  </p:timing>
+</p:sld>
+</file>
+
+<file path=ppt/slides/slide9.xml><?xml version="1.0" encoding="utf-8"?>
+<p:sld xmlns:a="http://schemas.openxmlformats.org/drawingml/2006/main" xmlns:r="http://schemas.openxmlformats.org/officeDocument/2006/relationships" xmlns:p="http://schemas.openxmlformats.org/presentationml/2006/main">
+  <p:cSld>
+    <p:spTree>
+      <p:nvGrpSpPr>
+        <p:cNvPr id="1" name=""/>
+        <p:cNvGrpSpPr/>
+        <p:nvPr/>
+      </p:nvGrpSpPr>
+      <p:grpSpPr>
+        <a:xfrm>
+          <a:off x="0" y="0"/>
+          <a:ext cx="0" cy="0"/>
+          <a:chOff x="0" y="0"/>
+          <a:chExt cx="0" cy="0"/>
+        </a:xfrm>
+      </p:grpSpPr>
+      <p:sp>
+        <p:nvSpPr>
+          <p:cNvPr id="3" name="Espace réservé du contenu 2"/>
+          <p:cNvSpPr>
+            <a:spLocks noGrp="1"/>
+          </p:cNvSpPr>
+          <p:nvPr>
+            <p:ph idx="1"/>
+          </p:nvPr>
+        </p:nvSpPr>
+        <p:spPr/>
+        <p:txBody>
+          <a:bodyPr>
+            <a:normAutofit/>
+          </a:bodyPr>
+          <a:lstStyle/>
+          <a:p>
+            <a:pPr marL="0" indent="0" algn="ctr">
+              <a:buNone/>
+            </a:pPr>
+            <a:endParaRPr lang="fr-FR" sz="4800" dirty="0" smtClean="0"/>
+          </a:p>
+          <a:p>
+            <a:pPr marL="0" indent="0" algn="ctr">
+              <a:buNone/>
+            </a:pPr>
+            <a:r>
+              <a:rPr lang="fr-FR" sz="4800" spc="-100" dirty="0">
+                <a:solidFill>
+                  <a:schemeClr val="tx2"/>
+                </a:solidFill>
+                <a:latin typeface="+mj-lt"/>
+                <a:ea typeface="+mj-ea"/>
+                <a:cs typeface="+mj-cs"/>
+              </a:rPr>
+              <a:t>Merci pour votre </a:t>
+            </a:r>
+          </a:p>
+          <a:p>
+            <a:pPr marL="0" indent="0" algn="ctr">
+              <a:buNone/>
+            </a:pPr>
+            <a:r>
+              <a:rPr lang="fr-FR" sz="4800" spc="-100" dirty="0">
+                <a:solidFill>
+                  <a:schemeClr val="tx2"/>
+                </a:solidFill>
+                <a:latin typeface="+mj-lt"/>
+                <a:ea typeface="+mj-ea"/>
+                <a:cs typeface="+mj-cs"/>
+              </a:rPr>
+              <a:t>attention </a:t>
+            </a:r>
+          </a:p>
+        </p:txBody>
+      </p:sp>
+      <p:sp>
+        <p:nvSpPr>
+          <p:cNvPr id="4" name="Espace réservé du numéro de diapositive 3"/>
+          <p:cNvSpPr>
+            <a:spLocks noGrp="1"/>
+          </p:cNvSpPr>
+          <p:nvPr>
+            <p:ph type="sldNum" sz="quarter" idx="12"/>
+          </p:nvPr>
+        </p:nvSpPr>
+        <p:spPr/>
+        <p:txBody>
+          <a:bodyPr/>
+          <a:lstStyle/>
+          <a:p>
+            <a:fld id="{454E7F5D-90A1-42E1-88A9-4F679448623C}" type="slidenum">
+              <a:rPr lang="fr-FR" smtClean="0"/>
+              <a:t>9</a:t>
+            </a:fld>
+            <a:endParaRPr lang="fr-FR"/>
+          </a:p>
+        </p:txBody>
+      </p:sp>
+    </p:spTree>
+    <p:extLst>
+      <p:ext uri="{BB962C8B-B14F-4D97-AF65-F5344CB8AC3E}">
+        <p14:creationId xmlns:p14="http://schemas.microsoft.com/office/powerpoint/2010/main" val="1741150457"/>
       </p:ext>
     </p:extLst>
   </p:cSld>

</xml_diff>